<commit_message>
doc: added live demo slide
</commit_message>
<xml_diff>
--- a/doc/presentation.pptx
+++ b/doc/presentation.pptx
@@ -19,6 +19,7 @@
     <p:sldId id="272" r:id="rId13"/>
     <p:sldId id="273" r:id="rId14"/>
     <p:sldId id="274" r:id="rId15"/>
+    <p:sldId id="275" r:id="rId16"/>
   </p:sldIdLst>
   <p:sldSz cx="12192000" cy="6858000"/>
   <p:notesSz cx="6858000" cy="9144000"/>
@@ -4081,13 +4082,13 @@
   <p:clrMapOvr>
     <a:masterClrMapping/>
   </p:clrMapOvr>
-  <mc:AlternateContent xmlns:mc="http://schemas.openxmlformats.org/markup-compatibility/2006">
-    <mc:Choice xmlns:p159="http://schemas.microsoft.com/office/powerpoint/2015/09/main" Requires="p159">
+  <mc:AlternateContent xmlns:mc="http://schemas.openxmlformats.org/markup-compatibility/2006" xmlns:p159="http://schemas.microsoft.com/office/powerpoint/2015/09/main">
+    <mc:Choice Requires="p159">
       <p:transition xmlns:p14="http://schemas.microsoft.com/office/powerpoint/2010/main" spd="slow" p14:dur="2000">
         <p159:morph option="byObject"/>
       </p:transition>
     </mc:Choice>
-    <mc:Fallback>
+    <mc:Fallback xmlns="">
       <p:transition spd="slow">
         <p:fade/>
       </p:transition>
@@ -4161,13 +4162,13 @@
   <p:clrMapOvr>
     <a:masterClrMapping/>
   </p:clrMapOvr>
-  <mc:AlternateContent xmlns:mc="http://schemas.openxmlformats.org/markup-compatibility/2006">
-    <mc:Choice xmlns:p159="http://schemas.microsoft.com/office/powerpoint/2015/09/main" Requires="p159">
+  <mc:AlternateContent xmlns:mc="http://schemas.openxmlformats.org/markup-compatibility/2006" xmlns:p159="http://schemas.microsoft.com/office/powerpoint/2015/09/main">
+    <mc:Choice Requires="p159">
       <p:transition xmlns:p14="http://schemas.microsoft.com/office/powerpoint/2010/main" spd="slow" p14:dur="2000">
         <p159:morph option="byObject"/>
       </p:transition>
     </mc:Choice>
-    <mc:Fallback>
+    <mc:Fallback xmlns="">
       <p:transition spd="slow">
         <p:fade/>
       </p:transition>
@@ -4241,13 +4242,13 @@
   <p:clrMapOvr>
     <a:masterClrMapping/>
   </p:clrMapOvr>
-  <mc:AlternateContent xmlns:mc="http://schemas.openxmlformats.org/markup-compatibility/2006">
-    <mc:Choice xmlns:p159="http://schemas.microsoft.com/office/powerpoint/2015/09/main" Requires="p159">
+  <mc:AlternateContent xmlns:mc="http://schemas.openxmlformats.org/markup-compatibility/2006" xmlns:p159="http://schemas.microsoft.com/office/powerpoint/2015/09/main">
+    <mc:Choice Requires="p159">
       <p:transition xmlns:p14="http://schemas.microsoft.com/office/powerpoint/2010/main" spd="slow" p14:dur="2000">
         <p159:morph option="byObject"/>
       </p:transition>
     </mc:Choice>
-    <mc:Fallback>
+    <mc:Fallback xmlns="">
       <p:transition spd="slow">
         <p:fade/>
       </p:transition>
@@ -4658,13 +4659,13 @@
   <p:clrMapOvr>
     <a:masterClrMapping/>
   </p:clrMapOvr>
-  <mc:AlternateContent xmlns:mc="http://schemas.openxmlformats.org/markup-compatibility/2006">
-    <mc:Choice xmlns:p159="http://schemas.microsoft.com/office/powerpoint/2015/09/main" Requires="p159">
+  <mc:AlternateContent xmlns:mc="http://schemas.openxmlformats.org/markup-compatibility/2006" xmlns:p159="http://schemas.microsoft.com/office/powerpoint/2015/09/main">
+    <mc:Choice Requires="p159">
       <p:transition xmlns:p14="http://schemas.microsoft.com/office/powerpoint/2010/main" spd="slow" p14:dur="2000">
         <p159:morph option="byObject"/>
       </p:transition>
     </mc:Choice>
-    <mc:Fallback>
+    <mc:Fallback xmlns="">
       <p:transition spd="slow">
         <p:fade/>
       </p:transition>
@@ -4965,8 +4966,9 @@
           <a:p>
             <a:r>
               <a:rPr lang="en-US" sz="6000"/>
-              <a:t>Fragen?</a:t>
-            </a:r>
+              <a:t>LIVE DEMO</a:t>
+            </a:r>
+            <a:endParaRPr lang="en-US" sz="6000" dirty="0"/>
           </a:p>
         </p:txBody>
       </p:sp>
@@ -5059,6 +5061,401 @@
     <p:extLst>
       <p:ext uri="{BB962C8B-B14F-4D97-AF65-F5344CB8AC3E}">
         <p14:creationId xmlns:p14="http://schemas.microsoft.com/office/powerpoint/2010/main" val="3786065440"/>
+      </p:ext>
+    </p:extLst>
+  </p:cSld>
+  <p:clrMapOvr>
+    <a:masterClrMapping/>
+  </p:clrMapOvr>
+</p:sld>
+</file>
+
+<file path=ppt/slides/slide15.xml><?xml version="1.0" encoding="utf-8"?>
+<p:sld xmlns:a="http://schemas.openxmlformats.org/drawingml/2006/main" xmlns:r="http://schemas.openxmlformats.org/officeDocument/2006/relationships" xmlns:p="http://schemas.openxmlformats.org/presentationml/2006/main">
+  <p:cSld>
+    <p:bg>
+      <p:bgPr>
+        <a:solidFill>
+          <a:schemeClr val="bg2">
+            <a:tint val="90000"/>
+            <a:shade val="97000"/>
+            <a:satMod val="130000"/>
+          </a:schemeClr>
+        </a:solidFill>
+        <a:effectLst/>
+      </p:bgPr>
+    </p:bg>
+    <p:spTree>
+      <p:nvGrpSpPr>
+        <p:cNvPr id="1" name=""/>
+        <p:cNvGrpSpPr/>
+        <p:nvPr/>
+      </p:nvGrpSpPr>
+      <p:grpSpPr>
+        <a:xfrm>
+          <a:off x="0" y="0"/>
+          <a:ext cx="0" cy="0"/>
+          <a:chOff x="0" y="0"/>
+          <a:chExt cx="0" cy="0"/>
+        </a:xfrm>
+      </p:grpSpPr>
+      <p:sp>
+        <p:nvSpPr>
+          <p:cNvPr id="10" name="Rectangle 9">
+            <a:extLst>
+              <a:ext uri="{FF2B5EF4-FFF2-40B4-BE49-F238E27FC236}">
+                <a16:creationId xmlns:a16="http://schemas.microsoft.com/office/drawing/2014/main" id="{39E3965E-AC41-4711-9D10-E25ABB132D86}"/>
+              </a:ext>
+              <a:ext uri="{C183D7F6-B498-43B3-948B-1728B52AA6E4}">
+                <adec:decorative xmlns:adec="http://schemas.microsoft.com/office/drawing/2017/decorative" val="1"/>
+              </a:ext>
+            </a:extLst>
+          </p:cNvPr>
+          <p:cNvSpPr>
+            <a:spLocks noGrp="1" noRot="1" noChangeAspect="1" noMove="1" noResize="1" noEditPoints="1" noAdjustHandles="1" noChangeArrowheads="1" noChangeShapeType="1" noTextEdit="1"/>
+          </p:cNvSpPr>
+          <p:nvPr>
+            <p:extLst>
+              <p:ext uri="{386F3935-93C4-4BCD-93E2-E3B085C9AB24}">
+                <p16:designElem xmlns:p16="http://schemas.microsoft.com/office/powerpoint/2015/main" val="1"/>
+              </p:ext>
+            </p:extLst>
+          </p:nvPr>
+        </p:nvSpPr>
+        <p:spPr>
+          <a:xfrm>
+            <a:off x="3175" y="6400800"/>
+            <a:ext cx="12188825" cy="457200"/>
+          </a:xfrm>
+          <a:prstGeom prst="rect">
+            <a:avLst/>
+          </a:prstGeom>
+          <a:solidFill>
+            <a:srgbClr val="262626"/>
+          </a:solidFill>
+          <a:ln>
+            <a:noFill/>
+          </a:ln>
+        </p:spPr>
+        <p:style>
+          <a:lnRef idx="2">
+            <a:schemeClr val="accent1">
+              <a:shade val="50000"/>
+            </a:schemeClr>
+          </a:lnRef>
+          <a:fillRef idx="1">
+            <a:schemeClr val="accent1"/>
+          </a:fillRef>
+          <a:effectRef idx="0">
+            <a:schemeClr val="accent1"/>
+          </a:effectRef>
+          <a:fontRef idx="minor">
+            <a:schemeClr val="lt1"/>
+          </a:fontRef>
+        </p:style>
+      </p:sp>
+      <p:cxnSp>
+        <p:nvCxnSpPr>
+          <p:cNvPr id="12" name="Straight Connector 11">
+            <a:extLst>
+              <a:ext uri="{FF2B5EF4-FFF2-40B4-BE49-F238E27FC236}">
+                <a16:creationId xmlns:a16="http://schemas.microsoft.com/office/drawing/2014/main" id="{1F5DC8C3-BA5F-4EED-BB9A-A14272BD82A1}"/>
+              </a:ext>
+              <a:ext uri="{C183D7F6-B498-43B3-948B-1728B52AA6E4}">
+                <adec:decorative xmlns:adec="http://schemas.microsoft.com/office/drawing/2017/decorative" val="1"/>
+              </a:ext>
+            </a:extLst>
+          </p:cNvPr>
+          <p:cNvCxnSpPr>
+            <a:cxnSpLocks noGrp="1" noRot="1" noChangeAspect="1" noMove="1" noResize="1" noEditPoints="1" noAdjustHandles="1" noChangeArrowheads="1" noChangeShapeType="1"/>
+          </p:cNvCxnSpPr>
+          <p:nvPr>
+            <p:extLst>
+              <p:ext uri="{386F3935-93C4-4BCD-93E2-E3B085C9AB24}">
+                <p16:designElem xmlns:p16="http://schemas.microsoft.com/office/powerpoint/2015/main" val="1"/>
+              </p:ext>
+            </p:extLst>
+          </p:nvPr>
+        </p:nvCxnSpPr>
+        <p:spPr>
+          <a:xfrm>
+            <a:off x="1207658" y="4474741"/>
+            <a:ext cx="9875520" cy="0"/>
+          </a:xfrm>
+          <a:prstGeom prst="line">
+            <a:avLst/>
+          </a:prstGeom>
+          <a:ln w="12700">
+            <a:solidFill>
+              <a:schemeClr val="tx1">
+                <a:lumMod val="75000"/>
+                <a:lumOff val="25000"/>
+              </a:schemeClr>
+            </a:solidFill>
+          </a:ln>
+        </p:spPr>
+        <p:style>
+          <a:lnRef idx="1">
+            <a:schemeClr val="accent1"/>
+          </a:lnRef>
+          <a:fillRef idx="0">
+            <a:schemeClr val="accent1"/>
+          </a:fillRef>
+          <a:effectRef idx="0">
+            <a:schemeClr val="accent1"/>
+          </a:effectRef>
+          <a:fontRef idx="minor">
+            <a:schemeClr val="tx1"/>
+          </a:fontRef>
+        </p:style>
+      </p:cxnSp>
+      <p:sp>
+        <p:nvSpPr>
+          <p:cNvPr id="14" name="Rectangle 13">
+            <a:extLst>
+              <a:ext uri="{FF2B5EF4-FFF2-40B4-BE49-F238E27FC236}">
+                <a16:creationId xmlns:a16="http://schemas.microsoft.com/office/drawing/2014/main" id="{F3B3B6C5-748F-437C-AE76-DB11FEA99E16}"/>
+              </a:ext>
+              <a:ext uri="{C183D7F6-B498-43B3-948B-1728B52AA6E4}">
+                <adec:decorative xmlns:adec="http://schemas.microsoft.com/office/drawing/2017/decorative" val="1"/>
+              </a:ext>
+            </a:extLst>
+          </p:cNvPr>
+          <p:cNvSpPr>
+            <a:spLocks noGrp="1" noRot="1" noChangeAspect="1" noMove="1" noResize="1" noEditPoints="1" noAdjustHandles="1" noChangeArrowheads="1" noChangeShapeType="1" noTextEdit="1"/>
+          </p:cNvSpPr>
+          <p:nvPr>
+            <p:extLst>
+              <p:ext uri="{386F3935-93C4-4BCD-93E2-E3B085C9AB24}">
+                <p16:designElem xmlns:p16="http://schemas.microsoft.com/office/powerpoint/2015/main" val="1"/>
+              </p:ext>
+            </p:extLst>
+          </p:nvPr>
+        </p:nvSpPr>
+        <p:spPr>
+          <a:xfrm>
+            <a:off x="3048" y="0"/>
+            <a:ext cx="12188952" cy="6858000"/>
+          </a:xfrm>
+          <a:prstGeom prst="rect">
+            <a:avLst/>
+          </a:prstGeom>
+          <a:solidFill>
+            <a:schemeClr val="bg1"/>
+          </a:solidFill>
+          <a:ln>
+            <a:noFill/>
+          </a:ln>
+        </p:spPr>
+        <p:style>
+          <a:lnRef idx="2">
+            <a:schemeClr val="accent1">
+              <a:shade val="50000"/>
+            </a:schemeClr>
+          </a:lnRef>
+          <a:fillRef idx="1">
+            <a:schemeClr val="accent1"/>
+          </a:fillRef>
+          <a:effectRef idx="0">
+            <a:schemeClr val="accent1"/>
+          </a:effectRef>
+          <a:fontRef idx="minor">
+            <a:schemeClr val="lt1"/>
+          </a:fontRef>
+        </p:style>
+        <p:txBody>
+          <a:bodyPr rtlCol="0" anchor="ctr"/>
+          <a:lstStyle/>
+          <a:p>
+            <a:pPr algn="ctr"/>
+            <a:endParaRPr lang="en-US"/>
+          </a:p>
+        </p:txBody>
+      </p:sp>
+      <p:sp useBgFill="1">
+        <p:nvSpPr>
+          <p:cNvPr id="16" name="Rectangle 15">
+            <a:extLst>
+              <a:ext uri="{FF2B5EF4-FFF2-40B4-BE49-F238E27FC236}">
+                <a16:creationId xmlns:a16="http://schemas.microsoft.com/office/drawing/2014/main" id="{197CEB5D-9BB2-475C-BA8D-AC88BB8C976E}"/>
+              </a:ext>
+              <a:ext uri="{C183D7F6-B498-43B3-948B-1728B52AA6E4}">
+                <adec:decorative xmlns:adec="http://schemas.microsoft.com/office/drawing/2017/decorative" val="1"/>
+              </a:ext>
+            </a:extLst>
+          </p:cNvPr>
+          <p:cNvSpPr>
+            <a:spLocks noGrp="1" noRot="1" noChangeAspect="1" noMove="1" noResize="1" noEditPoints="1" noAdjustHandles="1" noChangeArrowheads="1" noChangeShapeType="1" noTextEdit="1"/>
+          </p:cNvSpPr>
+          <p:nvPr>
+            <p:extLst>
+              <p:ext uri="{386F3935-93C4-4BCD-93E2-E3B085C9AB24}">
+                <p16:designElem xmlns:p16="http://schemas.microsoft.com/office/powerpoint/2015/main" val="1"/>
+              </p:ext>
+            </p:extLst>
+          </p:nvPr>
+        </p:nvSpPr>
+        <p:spPr bwMode="ltGray">
+          <a:xfrm>
+            <a:off x="458724" y="457200"/>
+            <a:ext cx="11274552" cy="5943600"/>
+          </a:xfrm>
+          <a:prstGeom prst="rect">
+            <a:avLst/>
+          </a:prstGeom>
+          <a:ln w="127000" cap="sq" cmpd="thinThick">
+            <a:noFill/>
+          </a:ln>
+        </p:spPr>
+        <p:style>
+          <a:lnRef idx="2">
+            <a:schemeClr val="accent1">
+              <a:shade val="50000"/>
+            </a:schemeClr>
+          </a:lnRef>
+          <a:fillRef idx="1">
+            <a:schemeClr val="accent1"/>
+          </a:fillRef>
+          <a:effectRef idx="0">
+            <a:schemeClr val="accent1"/>
+          </a:effectRef>
+          <a:fontRef idx="minor">
+            <a:schemeClr val="lt1"/>
+          </a:fontRef>
+        </p:style>
+        <p:txBody>
+          <a:bodyPr rtlCol="0" anchor="ctr"/>
+          <a:lstStyle/>
+          <a:p>
+            <a:pPr algn="ctr"/>
+            <a:endParaRPr lang="en-US"/>
+          </a:p>
+        </p:txBody>
+      </p:sp>
+      <p:sp>
+        <p:nvSpPr>
+          <p:cNvPr id="4" name="Titel 3">
+            <a:extLst>
+              <a:ext uri="{FF2B5EF4-FFF2-40B4-BE49-F238E27FC236}">
+                <a16:creationId xmlns:a16="http://schemas.microsoft.com/office/drawing/2014/main" id="{FCAE455A-4A7F-EE96-CF6E-57BBADCF1BF0}"/>
+              </a:ext>
+            </a:extLst>
+          </p:cNvPr>
+          <p:cNvSpPr>
+            <a:spLocks noGrp="1"/>
+          </p:cNvSpPr>
+          <p:nvPr>
+            <p:ph type="title"/>
+          </p:nvPr>
+        </p:nvSpPr>
+        <p:spPr>
+          <a:xfrm>
+            <a:off x="4380588" y="965199"/>
+            <a:ext cx="6766078" cy="4927601"/>
+          </a:xfrm>
+        </p:spPr>
+        <p:txBody>
+          <a:bodyPr vert="horz" lIns="91440" tIns="45720" rIns="91440" bIns="45720" rtlCol="0" anchor="ctr">
+            <a:normAutofit/>
+          </a:bodyPr>
+          <a:lstStyle/>
+          <a:p>
+            <a:r>
+              <a:rPr lang="en-US" sz="6000"/>
+              <a:t>Fragen?</a:t>
+            </a:r>
+          </a:p>
+        </p:txBody>
+      </p:sp>
+      <p:sp>
+        <p:nvSpPr>
+          <p:cNvPr id="5" name="Textplatzhalter 4">
+            <a:extLst>
+              <a:ext uri="{FF2B5EF4-FFF2-40B4-BE49-F238E27FC236}">
+                <a16:creationId xmlns:a16="http://schemas.microsoft.com/office/drawing/2014/main" id="{4A0DB270-A21A-7DDA-4AA5-202B2D6CE603}"/>
+              </a:ext>
+            </a:extLst>
+          </p:cNvPr>
+          <p:cNvSpPr>
+            <a:spLocks noGrp="1"/>
+          </p:cNvSpPr>
+          <p:nvPr>
+            <p:ph type="body" idx="1"/>
+          </p:nvPr>
+        </p:nvSpPr>
+        <p:spPr>
+          <a:xfrm>
+            <a:off x="1023257" y="965198"/>
+            <a:ext cx="2707937" cy="4927602"/>
+          </a:xfrm>
+        </p:spPr>
+        <p:txBody>
+          <a:bodyPr vert="horz" lIns="91440" tIns="45720" rIns="91440" bIns="45720" rtlCol="0" anchor="ctr">
+            <a:normAutofit/>
+          </a:bodyPr>
+          <a:lstStyle/>
+          <a:p>
+            <a:pPr algn="r"/>
+            <a:endParaRPr lang="en-US" sz="2000"/>
+          </a:p>
+        </p:txBody>
+      </p:sp>
+      <p:cxnSp>
+        <p:nvCxnSpPr>
+          <p:cNvPr id="18" name="Straight Connector 17">
+            <a:extLst>
+              <a:ext uri="{FF2B5EF4-FFF2-40B4-BE49-F238E27FC236}">
+                <a16:creationId xmlns:a16="http://schemas.microsoft.com/office/drawing/2014/main" id="{BB14AD1F-ADD5-46E7-966F-4C0290232FF9}"/>
+              </a:ext>
+              <a:ext uri="{C183D7F6-B498-43B3-948B-1728B52AA6E4}">
+                <adec:decorative xmlns:adec="http://schemas.microsoft.com/office/drawing/2017/decorative" val="1"/>
+              </a:ext>
+            </a:extLst>
+          </p:cNvPr>
+          <p:cNvCxnSpPr>
+            <a:cxnSpLocks noGrp="1" noRot="1" noChangeAspect="1" noMove="1" noResize="1" noEditPoints="1" noAdjustHandles="1" noChangeArrowheads="1" noChangeShapeType="1"/>
+          </p:cNvCxnSpPr>
+          <p:nvPr>
+            <p:extLst>
+              <p:ext uri="{386F3935-93C4-4BCD-93E2-E3B085C9AB24}">
+                <p16:designElem xmlns:p16="http://schemas.microsoft.com/office/powerpoint/2015/main" val="1"/>
+              </p:ext>
+            </p:extLst>
+          </p:nvPr>
+        </p:nvCxnSpPr>
+        <p:spPr>
+          <a:xfrm>
+            <a:off x="4055891" y="2057399"/>
+            <a:ext cx="0" cy="2743200"/>
+          </a:xfrm>
+          <a:prstGeom prst="line">
+            <a:avLst/>
+          </a:prstGeom>
+          <a:ln w="19050">
+            <a:solidFill>
+              <a:schemeClr val="tx1"/>
+            </a:solidFill>
+          </a:ln>
+        </p:spPr>
+        <p:style>
+          <a:lnRef idx="1">
+            <a:schemeClr val="accent1"/>
+          </a:lnRef>
+          <a:fillRef idx="0">
+            <a:schemeClr val="accent1"/>
+          </a:fillRef>
+          <a:effectRef idx="0">
+            <a:schemeClr val="accent1"/>
+          </a:effectRef>
+          <a:fontRef idx="minor">
+            <a:schemeClr val="tx1"/>
+          </a:fontRef>
+        </p:style>
+      </p:cxnSp>
+    </p:spTree>
+    <p:extLst>
+      <p:ext uri="{BB962C8B-B14F-4D97-AF65-F5344CB8AC3E}">
+        <p14:creationId xmlns:p14="http://schemas.microsoft.com/office/powerpoint/2010/main" val="1077803139"/>
       </p:ext>
     </p:extLst>
   </p:cSld>
@@ -6108,13 +6505,13 @@
   <p:clrMapOvr>
     <a:masterClrMapping/>
   </p:clrMapOvr>
-  <mc:AlternateContent xmlns:mc="http://schemas.openxmlformats.org/markup-compatibility/2006">
-    <mc:Choice xmlns:p159="http://schemas.microsoft.com/office/powerpoint/2015/09/main" Requires="p159">
+  <mc:AlternateContent xmlns:mc="http://schemas.openxmlformats.org/markup-compatibility/2006" xmlns:p159="http://schemas.microsoft.com/office/powerpoint/2015/09/main">
+    <mc:Choice Requires="p159">
       <p:transition xmlns:p14="http://schemas.microsoft.com/office/powerpoint/2010/main" spd="slow" p14:dur="2000">
         <p159:morph option="byObject"/>
       </p:transition>
     </mc:Choice>
-    <mc:Fallback>
+    <mc:Fallback xmlns="">
       <p:transition spd="slow">
         <p:fade/>
       </p:transition>
@@ -6188,13 +6585,13 @@
   <p:clrMapOvr>
     <a:masterClrMapping/>
   </p:clrMapOvr>
-  <mc:AlternateContent xmlns:mc="http://schemas.openxmlformats.org/markup-compatibility/2006">
-    <mc:Choice xmlns:p159="http://schemas.microsoft.com/office/powerpoint/2015/09/main" Requires="p159">
+  <mc:AlternateContent xmlns:mc="http://schemas.openxmlformats.org/markup-compatibility/2006" xmlns:p159="http://schemas.microsoft.com/office/powerpoint/2015/09/main">
+    <mc:Choice Requires="p159">
       <p:transition xmlns:p14="http://schemas.microsoft.com/office/powerpoint/2010/main" spd="slow" p14:dur="2000">
         <p159:morph option="byObject"/>
       </p:transition>
     </mc:Choice>
-    <mc:Fallback>
+    <mc:Fallback xmlns="">
       <p:transition spd="slow">
         <p:fade/>
       </p:transition>
@@ -6268,13 +6665,13 @@
   <p:clrMapOvr>
     <a:masterClrMapping/>
   </p:clrMapOvr>
-  <mc:AlternateContent xmlns:mc="http://schemas.openxmlformats.org/markup-compatibility/2006">
-    <mc:Choice xmlns:p159="http://schemas.microsoft.com/office/powerpoint/2015/09/main" Requires="p159">
+  <mc:AlternateContent xmlns:mc="http://schemas.openxmlformats.org/markup-compatibility/2006" xmlns:p159="http://schemas.microsoft.com/office/powerpoint/2015/09/main">
+    <mc:Choice Requires="p159">
       <p:transition xmlns:p14="http://schemas.microsoft.com/office/powerpoint/2010/main" spd="slow" p14:dur="2000">
         <p159:morph option="byObject"/>
       </p:transition>
     </mc:Choice>
-    <mc:Fallback>
+    <mc:Fallback xmlns="">
       <p:transition spd="slow">
         <p:fade/>
       </p:transition>
@@ -6348,13 +6745,13 @@
   <p:clrMapOvr>
     <a:masterClrMapping/>
   </p:clrMapOvr>
-  <mc:AlternateContent xmlns:mc="http://schemas.openxmlformats.org/markup-compatibility/2006">
-    <mc:Choice xmlns:p159="http://schemas.microsoft.com/office/powerpoint/2015/09/main" Requires="p159">
+  <mc:AlternateContent xmlns:mc="http://schemas.openxmlformats.org/markup-compatibility/2006" xmlns:p159="http://schemas.microsoft.com/office/powerpoint/2015/09/main">
+    <mc:Choice Requires="p159">
       <p:transition xmlns:p14="http://schemas.microsoft.com/office/powerpoint/2010/main" spd="slow" p14:dur="2000">
         <p159:morph option="byObject"/>
       </p:transition>
     </mc:Choice>
-    <mc:Fallback>
+    <mc:Fallback xmlns="">
       <p:transition spd="slow">
         <p:fade/>
       </p:transition>

</xml_diff>